<commit_message>
update with stat analysis
</commit_message>
<xml_diff>
--- a/Group4_Brief.pptx
+++ b/Group4_Brief.pptx
@@ -25091,8 +25091,8 @@
         </p:nvSpPr>
         <p:spPr>
           <a:xfrm>
-            <a:off x="92776" y="253457"/>
-            <a:ext cx="5653875" cy="646331"/>
+            <a:off x="81759" y="308542"/>
+            <a:ext cx="7002087" cy="646331"/>
           </a:xfrm>
           <a:prstGeom prst="rect">
             <a:avLst/>
@@ -25128,8 +25128,217 @@
                 <a:ea typeface="Verdana" panose="020B0604030504040204" pitchFamily="34" charset="0"/>
                 <a:cs typeface="Courier New" panose="02070309020205020404" pitchFamily="49" charset="0"/>
               </a:rPr>
-              <a:t>Conclusion</a:t>
+              <a:t>Conclusion / Recommendations</a:t>
             </a:r>
+          </a:p>
+        </p:txBody>
+      </p:sp>
+      <p:sp>
+        <p:nvSpPr>
+          <p:cNvPr id="3" name="TextBox 2">
+            <a:extLst>
+              <a:ext uri="{FF2B5EF4-FFF2-40B4-BE49-F238E27FC236}">
+                <a16:creationId xmlns:a16="http://schemas.microsoft.com/office/drawing/2014/main" id="{5FF11442-2D64-CA51-C974-A1D345E93C7E}"/>
+              </a:ext>
+            </a:extLst>
+          </p:cNvPr>
+          <p:cNvSpPr txBox="1"/>
+          <p:nvPr/>
+        </p:nvSpPr>
+        <p:spPr>
+          <a:xfrm>
+            <a:off x="264404" y="1300457"/>
+            <a:ext cx="11622795" cy="2301592"/>
+          </a:xfrm>
+          <a:prstGeom prst="rect">
+            <a:avLst/>
+          </a:prstGeom>
+          <a:noFill/>
+        </p:spPr>
+        <p:txBody>
+          <a:bodyPr wrap="square">
+            <a:spAutoFit/>
+          </a:bodyPr>
+          <a:lstStyle/>
+          <a:p>
+            <a:pPr marL="342900" marR="0" lvl="0" indent="-342900">
+              <a:lnSpc>
+                <a:spcPct val="115000"/>
+              </a:lnSpc>
+              <a:spcBef>
+                <a:spcPts val="0"/>
+              </a:spcBef>
+              <a:spcAft>
+                <a:spcPts val="0"/>
+              </a:spcAft>
+              <a:buAutoNum type="arabicParenR"/>
+            </a:pPr>
+            <a:r>
+              <a:rPr lang="en-US" sz="1800" u="none" strike="noStrike" dirty="0">
+                <a:effectLst/>
+                <a:latin typeface="PT Sans" panose="020B0503020203020204" pitchFamily="34" charset="77"/>
+                <a:ea typeface="Arial" panose="020B0604020202020204" pitchFamily="34" charset="0"/>
+              </a:rPr>
+              <a:t>Does production budget correlate to a box office profit?</a:t>
+            </a:r>
+          </a:p>
+          <a:p>
+            <a:pPr marL="342900" marR="0" lvl="0" indent="-342900">
+              <a:lnSpc>
+                <a:spcPct val="115000"/>
+              </a:lnSpc>
+              <a:spcBef>
+                <a:spcPts val="0"/>
+              </a:spcBef>
+              <a:spcAft>
+                <a:spcPts val="0"/>
+              </a:spcAft>
+              <a:buAutoNum type="arabicParenR"/>
+            </a:pPr>
+            <a:endParaRPr lang="en-US" sz="1800" u="none" strike="noStrike" dirty="0">
+              <a:effectLst/>
+              <a:latin typeface="PT Sans" panose="020B0503020203020204" pitchFamily="34" charset="77"/>
+              <a:ea typeface="Arial" panose="020B0604020202020204" pitchFamily="34" charset="0"/>
+            </a:endParaRPr>
+          </a:p>
+          <a:p>
+            <a:pPr marR="0" lvl="0">
+              <a:lnSpc>
+                <a:spcPct val="115000"/>
+              </a:lnSpc>
+              <a:spcBef>
+                <a:spcPts val="0"/>
+              </a:spcBef>
+              <a:spcAft>
+                <a:spcPts val="0"/>
+              </a:spcAft>
+            </a:pPr>
+            <a:r>
+              <a:rPr lang="en-US" sz="1800" u="none" strike="noStrike" dirty="0">
+                <a:effectLst/>
+                <a:latin typeface="PT Sans" panose="020B0503020203020204" pitchFamily="34" charset="77"/>
+                <a:ea typeface="Arial" panose="020B0604020202020204" pitchFamily="34" charset="0"/>
+              </a:rPr>
+              <a:t>2) Does a higher production budget correlate to a higher audience score?</a:t>
+            </a:r>
+          </a:p>
+          <a:p>
+            <a:pPr marR="0" lvl="0">
+              <a:lnSpc>
+                <a:spcPct val="115000"/>
+              </a:lnSpc>
+              <a:spcBef>
+                <a:spcPts val="0"/>
+              </a:spcBef>
+              <a:spcAft>
+                <a:spcPts val="0"/>
+              </a:spcAft>
+            </a:pPr>
+            <a:endParaRPr lang="en-US" sz="1800" u="none" strike="noStrike" dirty="0">
+              <a:effectLst/>
+              <a:latin typeface="PT Sans" panose="020B0503020203020204" pitchFamily="34" charset="77"/>
+              <a:ea typeface="Arial" panose="020B0604020202020204" pitchFamily="34" charset="0"/>
+            </a:endParaRPr>
+          </a:p>
+          <a:p>
+            <a:pPr marR="0" lvl="0">
+              <a:lnSpc>
+                <a:spcPct val="115000"/>
+              </a:lnSpc>
+              <a:spcBef>
+                <a:spcPts val="0"/>
+              </a:spcBef>
+              <a:spcAft>
+                <a:spcPts val="0"/>
+              </a:spcAft>
+            </a:pPr>
+            <a:r>
+              <a:rPr lang="en-US" sz="1800" u="none" strike="noStrike" dirty="0">
+                <a:effectLst/>
+                <a:latin typeface="PT Sans" panose="020B0503020203020204" pitchFamily="34" charset="77"/>
+                <a:ea typeface="Arial" panose="020B0604020202020204" pitchFamily="34" charset="0"/>
+              </a:rPr>
+              <a:t>3) Does a higher audience score correlate to a higher box office profit?</a:t>
+            </a:r>
+          </a:p>
+          <a:p>
+            <a:pPr marR="0" lvl="0">
+              <a:lnSpc>
+                <a:spcPct val="115000"/>
+              </a:lnSpc>
+              <a:spcBef>
+                <a:spcPts val="0"/>
+              </a:spcBef>
+              <a:spcAft>
+                <a:spcPts val="0"/>
+              </a:spcAft>
+            </a:pPr>
+            <a:endParaRPr lang="en-US" sz="1800" u="none" strike="noStrike" dirty="0">
+              <a:effectLst/>
+              <a:latin typeface="PT Sans" panose="020B0503020203020204" pitchFamily="34" charset="77"/>
+              <a:ea typeface="Arial" panose="020B0604020202020204" pitchFamily="34" charset="0"/>
+            </a:endParaRPr>
+          </a:p>
+          <a:p>
+            <a:pPr marR="0" lvl="0">
+              <a:lnSpc>
+                <a:spcPct val="115000"/>
+              </a:lnSpc>
+              <a:spcBef>
+                <a:spcPts val="0"/>
+              </a:spcBef>
+              <a:spcAft>
+                <a:spcPts val="0"/>
+              </a:spcAft>
+            </a:pPr>
+            <a:r>
+              <a:rPr lang="en-US" sz="1800" u="none" strike="noStrike" dirty="0">
+                <a:effectLst/>
+                <a:latin typeface="PT Sans" panose="020B0503020203020204" pitchFamily="34" charset="77"/>
+                <a:ea typeface="Arial" panose="020B0604020202020204" pitchFamily="34" charset="0"/>
+              </a:rPr>
+              <a:t>4) Does movie genre have an effect on box office profit and audience score?</a:t>
+            </a:r>
+          </a:p>
+        </p:txBody>
+      </p:sp>
+      <p:sp>
+        <p:nvSpPr>
+          <p:cNvPr id="5" name="TextBox 4">
+            <a:extLst>
+              <a:ext uri="{FF2B5EF4-FFF2-40B4-BE49-F238E27FC236}">
+                <a16:creationId xmlns:a16="http://schemas.microsoft.com/office/drawing/2014/main" id="{FCA60651-0F2A-B3AB-E17D-0542FD425DCF}"/>
+              </a:ext>
+            </a:extLst>
+          </p:cNvPr>
+          <p:cNvSpPr txBox="1"/>
+          <p:nvPr/>
+        </p:nvSpPr>
+        <p:spPr>
+          <a:xfrm>
+            <a:off x="81759" y="4282674"/>
+            <a:ext cx="2242800" cy="369332"/>
+          </a:xfrm>
+          <a:prstGeom prst="rect">
+            <a:avLst/>
+          </a:prstGeom>
+          <a:noFill/>
+        </p:spPr>
+        <p:txBody>
+          <a:bodyPr wrap="square">
+            <a:spAutoFit/>
+          </a:bodyPr>
+          <a:lstStyle/>
+          <a:p>
+            <a:r>
+              <a:rPr lang="en-US" sz="1800" b="1" u="sng" dirty="0">
+                <a:latin typeface="PT Sans" panose="020B0503020203020204" pitchFamily="34" charset="77"/>
+                <a:ea typeface="Verdana" panose="020B0604030504040204" pitchFamily="34" charset="0"/>
+                <a:cs typeface="Courier New" panose="02070309020205020404" pitchFamily="49" charset="0"/>
+              </a:rPr>
+              <a:t>Recommendations</a:t>
+            </a:r>
+            <a:endParaRPr lang="en-US" b="1" u="sng" dirty="0"/>
           </a:p>
         </p:txBody>
       </p:sp>
@@ -31660,7 +31869,7 @@
         <p:spPr>
           <a:xfrm>
             <a:off x="0" y="1167063"/>
-            <a:ext cx="12192000" cy="2862322"/>
+            <a:ext cx="12192000" cy="3170099"/>
           </a:xfrm>
           <a:prstGeom prst="rect">
             <a:avLst/>
@@ -31736,6 +31945,14 @@
                 <a:latin typeface="PT Sans" panose="020B0503020203020204" pitchFamily="34" charset="77"/>
               </a:rPr>
               <a:t>Total budget = base budget + (base budget * 0.5)  </a:t>
+            </a:r>
+          </a:p>
+          <a:p>
+            <a:r>
+              <a:rPr lang="en-US" sz="2000" dirty="0">
+                <a:latin typeface="PT Sans" panose="020B0503020203020204" pitchFamily="34" charset="77"/>
+              </a:rPr>
+              <a:t>Percent Profit = (Revenue – Total Budget) / Total Budget</a:t>
             </a:r>
           </a:p>
           <a:p>

</xml_diff>